<commit_message>
object model for semantic information
git-svn-id: https://linqtoweb.svn.codeplex.com/svn@44001 142e9c35-602f-4880-9f37-ec48a24daa6a
</commit_message>
<xml_diff>
--- a/Documentation/diagrams.pptx
+++ b/Documentation/diagrams.pptx
@@ -5342,6 +5342,103 @@
       </p:grpSpPr>
       <p:sp>
         <p:nvSpPr>
+          <p:cNvPr id="16" name="Vývojový diagram: postup 15"/>
+          <p:cNvSpPr/>
+          <p:nvPr/>
+        </p:nvSpPr>
+        <p:spPr>
+          <a:xfrm>
+            <a:off x="0" y="3214686"/>
+            <a:ext cx="9144000" cy="3286148"/>
+          </a:xfrm>
+          <a:prstGeom prst="flowChartProcess">
+            <a:avLst/>
+          </a:prstGeom>
+          <a:solidFill>
+            <a:schemeClr val="bg1">
+              <a:lumMod val="95000"/>
+            </a:schemeClr>
+          </a:solidFill>
+          <a:ln>
+            <a:noFill/>
+          </a:ln>
+        </p:spPr>
+        <p:style>
+          <a:lnRef idx="2">
+            <a:schemeClr val="accent1">
+              <a:shade val="50000"/>
+            </a:schemeClr>
+          </a:lnRef>
+          <a:fillRef idx="1">
+            <a:schemeClr val="accent1"/>
+          </a:fillRef>
+          <a:effectRef idx="0">
+            <a:schemeClr val="accent1"/>
+          </a:effectRef>
+          <a:fontRef idx="minor">
+            <a:schemeClr val="lt1"/>
+          </a:fontRef>
+        </p:style>
+        <p:txBody>
+          <a:bodyPr rtlCol="0" anchor="ctr"/>
+          <a:lstStyle/>
+          <a:p>
+            <a:pPr algn="ctr"/>
+            <a:endParaRPr lang="cs-CZ"/>
+          </a:p>
+        </p:txBody>
+      </p:sp>
+      <p:sp>
+        <p:nvSpPr>
+          <p:cNvPr id="12" name="Vývojový diagram: postup 11"/>
+          <p:cNvSpPr/>
+          <p:nvPr/>
+        </p:nvSpPr>
+        <p:spPr>
+          <a:xfrm>
+            <a:off x="0" y="1071546"/>
+            <a:ext cx="9144000" cy="1714512"/>
+          </a:xfrm>
+          <a:prstGeom prst="flowChartProcess">
+            <a:avLst/>
+          </a:prstGeom>
+          <a:solidFill>
+            <a:schemeClr val="accent5">
+              <a:lumMod val="20000"/>
+              <a:lumOff val="80000"/>
+            </a:schemeClr>
+          </a:solidFill>
+          <a:ln>
+            <a:noFill/>
+          </a:ln>
+        </p:spPr>
+        <p:style>
+          <a:lnRef idx="2">
+            <a:schemeClr val="accent1">
+              <a:shade val="50000"/>
+            </a:schemeClr>
+          </a:lnRef>
+          <a:fillRef idx="1">
+            <a:schemeClr val="accent1"/>
+          </a:fillRef>
+          <a:effectRef idx="0">
+            <a:schemeClr val="accent1"/>
+          </a:effectRef>
+          <a:fontRef idx="minor">
+            <a:schemeClr val="lt1"/>
+          </a:fontRef>
+        </p:style>
+        <p:txBody>
+          <a:bodyPr rtlCol="0" anchor="ctr"/>
+          <a:lstStyle/>
+          <a:p>
+            <a:pPr algn="ctr"/>
+            <a:endParaRPr lang="cs-CZ" dirty="0"/>
+          </a:p>
+        </p:txBody>
+      </p:sp>
+      <p:sp>
+        <p:nvSpPr>
           <p:cNvPr id="3" name="Nadpis 3"/>
           <p:cNvSpPr>
             <a:spLocks noGrp="1"/>
@@ -5364,9 +5461,530 @@
           <a:p>
             <a:r>
               <a:rPr lang="en-US" sz="1800" dirty="0" smtClean="0"/>
-              <a:t>LINQ to Web, generating object model</a:t>
+              <a:t>LINQ to Web, generating abstraction (</a:t>
+            </a:r>
+            <a:r>
+              <a:rPr lang="en-US" sz="1800" dirty="0" smtClean="0"/>
+              <a:t>object model)</a:t>
             </a:r>
             <a:endParaRPr lang="en-US" sz="1800" dirty="0"/>
+          </a:p>
+        </p:txBody>
+      </p:sp>
+      <p:sp>
+        <p:nvSpPr>
+          <p:cNvPr id="4" name="Vývojový diagram: postup 3"/>
+          <p:cNvSpPr/>
+          <p:nvPr/>
+        </p:nvSpPr>
+        <p:spPr>
+          <a:xfrm>
+            <a:off x="928662" y="2143116"/>
+            <a:ext cx="2214578" cy="357190"/>
+          </a:xfrm>
+          <a:prstGeom prst="flowChartProcess">
+            <a:avLst/>
+          </a:prstGeom>
+          <a:solidFill>
+            <a:schemeClr val="accent1">
+              <a:lumMod val="20000"/>
+              <a:lumOff val="80000"/>
+            </a:schemeClr>
+          </a:solidFill>
+        </p:spPr>
+        <p:style>
+          <a:lnRef idx="2">
+            <a:schemeClr val="accent1">
+              <a:shade val="50000"/>
+            </a:schemeClr>
+          </a:lnRef>
+          <a:fillRef idx="1">
+            <a:schemeClr val="accent1"/>
+          </a:fillRef>
+          <a:effectRef idx="0">
+            <a:schemeClr val="accent1"/>
+          </a:effectRef>
+          <a:fontRef idx="minor">
+            <a:schemeClr val="lt1"/>
+          </a:fontRef>
+        </p:style>
+        <p:txBody>
+          <a:bodyPr rtlCol="0" anchor="ctr"/>
+          <a:lstStyle/>
+          <a:p>
+            <a:pPr algn="ctr"/>
+            <a:r>
+              <a:rPr lang="en-US" dirty="0" smtClean="0">
+                <a:solidFill>
+                  <a:schemeClr val="tx2"/>
+                </a:solidFill>
+              </a:rPr>
+              <a:t>subject</a:t>
+            </a:r>
+            <a:endParaRPr lang="cs-CZ" dirty="0">
+              <a:solidFill>
+                <a:schemeClr val="tx2"/>
+              </a:solidFill>
+            </a:endParaRPr>
+          </a:p>
+        </p:txBody>
+      </p:sp>
+      <p:sp>
+        <p:nvSpPr>
+          <p:cNvPr id="5" name="Vývojový diagram: postup 4"/>
+          <p:cNvSpPr/>
+          <p:nvPr/>
+        </p:nvSpPr>
+        <p:spPr>
+          <a:xfrm>
+            <a:off x="5643570" y="2143116"/>
+            <a:ext cx="2214578" cy="357190"/>
+          </a:xfrm>
+          <a:prstGeom prst="flowChartProcess">
+            <a:avLst/>
+          </a:prstGeom>
+          <a:solidFill>
+            <a:schemeClr val="accent6">
+              <a:lumMod val="20000"/>
+              <a:lumOff val="80000"/>
+            </a:schemeClr>
+          </a:solidFill>
+        </p:spPr>
+        <p:style>
+          <a:lnRef idx="2">
+            <a:schemeClr val="accent1">
+              <a:shade val="50000"/>
+            </a:schemeClr>
+          </a:lnRef>
+          <a:fillRef idx="1">
+            <a:schemeClr val="accent1"/>
+          </a:fillRef>
+          <a:effectRef idx="0">
+            <a:schemeClr val="accent1"/>
+          </a:effectRef>
+          <a:fontRef idx="minor">
+            <a:schemeClr val="lt1"/>
+          </a:fontRef>
+        </p:style>
+        <p:txBody>
+          <a:bodyPr rtlCol="0" anchor="ctr"/>
+          <a:lstStyle/>
+          <a:p>
+            <a:pPr algn="ctr"/>
+            <a:r>
+              <a:rPr lang="en-US" dirty="0" smtClean="0">
+                <a:solidFill>
+                  <a:schemeClr val="tx2"/>
+                </a:solidFill>
+              </a:rPr>
+              <a:t>object</a:t>
+            </a:r>
+            <a:endParaRPr lang="cs-CZ" dirty="0">
+              <a:solidFill>
+                <a:schemeClr val="tx2"/>
+              </a:solidFill>
+            </a:endParaRPr>
+          </a:p>
+        </p:txBody>
+      </p:sp>
+      <p:sp>
+        <p:nvSpPr>
+          <p:cNvPr id="6" name="Vývojový diagram: postup 5"/>
+          <p:cNvSpPr/>
+          <p:nvPr/>
+        </p:nvSpPr>
+        <p:spPr>
+          <a:xfrm>
+            <a:off x="3286116" y="2143116"/>
+            <a:ext cx="2214578" cy="357190"/>
+          </a:xfrm>
+          <a:prstGeom prst="flowChartProcess">
+            <a:avLst/>
+          </a:prstGeom>
+          <a:solidFill>
+            <a:schemeClr val="accent3">
+              <a:lumMod val="20000"/>
+              <a:lumOff val="80000"/>
+            </a:schemeClr>
+          </a:solidFill>
+        </p:spPr>
+        <p:style>
+          <a:lnRef idx="2">
+            <a:schemeClr val="accent1">
+              <a:shade val="50000"/>
+            </a:schemeClr>
+          </a:lnRef>
+          <a:fillRef idx="1">
+            <a:schemeClr val="accent1"/>
+          </a:fillRef>
+          <a:effectRef idx="0">
+            <a:schemeClr val="accent1"/>
+          </a:effectRef>
+          <a:fontRef idx="minor">
+            <a:schemeClr val="lt1"/>
+          </a:fontRef>
+        </p:style>
+        <p:txBody>
+          <a:bodyPr rtlCol="0" anchor="ctr"/>
+          <a:lstStyle/>
+          <a:p>
+            <a:pPr algn="ctr"/>
+            <a:r>
+              <a:rPr lang="en-US" dirty="0" smtClean="0">
+                <a:solidFill>
+                  <a:schemeClr val="tx2"/>
+                </a:solidFill>
+              </a:rPr>
+              <a:t>predicate</a:t>
+            </a:r>
+            <a:endParaRPr lang="cs-CZ" dirty="0">
+              <a:solidFill>
+                <a:schemeClr val="tx2"/>
+              </a:solidFill>
+            </a:endParaRPr>
+          </a:p>
+        </p:txBody>
+      </p:sp>
+      <p:cxnSp>
+        <p:nvCxnSpPr>
+          <p:cNvPr id="8" name="Přímá spojovací čára 7"/>
+          <p:cNvCxnSpPr>
+            <a:stCxn id="4" idx="3"/>
+            <a:endCxn id="6" idx="1"/>
+          </p:cNvCxnSpPr>
+          <p:nvPr/>
+        </p:nvCxnSpPr>
+        <p:spPr>
+          <a:xfrm>
+            <a:off x="3143240" y="2321711"/>
+            <a:ext cx="142876" cy="0"/>
+          </a:xfrm>
+          <a:prstGeom prst="line">
+            <a:avLst/>
+          </a:prstGeom>
+          <a:ln w="19050"/>
+        </p:spPr>
+        <p:style>
+          <a:lnRef idx="1">
+            <a:schemeClr val="accent1"/>
+          </a:lnRef>
+          <a:fillRef idx="0">
+            <a:schemeClr val="accent1"/>
+          </a:fillRef>
+          <a:effectRef idx="0">
+            <a:schemeClr val="accent1"/>
+          </a:effectRef>
+          <a:fontRef idx="minor">
+            <a:schemeClr val="tx1"/>
+          </a:fontRef>
+        </p:style>
+      </p:cxnSp>
+      <p:cxnSp>
+        <p:nvCxnSpPr>
+          <p:cNvPr id="9" name="Přímá spojovací čára 8"/>
+          <p:cNvCxnSpPr>
+            <a:stCxn id="6" idx="3"/>
+            <a:endCxn id="5" idx="1"/>
+          </p:cNvCxnSpPr>
+          <p:nvPr/>
+        </p:nvCxnSpPr>
+        <p:spPr>
+          <a:xfrm>
+            <a:off x="5500694" y="2321711"/>
+            <a:ext cx="142876" cy="0"/>
+          </a:xfrm>
+          <a:prstGeom prst="line">
+            <a:avLst/>
+          </a:prstGeom>
+          <a:ln w="19050"/>
+        </p:spPr>
+        <p:style>
+          <a:lnRef idx="1">
+            <a:schemeClr val="accent1"/>
+          </a:lnRef>
+          <a:fillRef idx="0">
+            <a:schemeClr val="accent1"/>
+          </a:fillRef>
+          <a:effectRef idx="0">
+            <a:schemeClr val="accent1"/>
+          </a:effectRef>
+          <a:fontRef idx="minor">
+            <a:schemeClr val="tx1"/>
+          </a:fontRef>
+        </p:style>
+      </p:cxnSp>
+      <p:sp>
+        <p:nvSpPr>
+          <p:cNvPr id="13" name="Vývojový diagram: postup 12"/>
+          <p:cNvSpPr/>
+          <p:nvPr/>
+        </p:nvSpPr>
+        <p:spPr>
+          <a:xfrm>
+            <a:off x="928662" y="1285860"/>
+            <a:ext cx="6929486" cy="500066"/>
+          </a:xfrm>
+          <a:prstGeom prst="flowChartProcess">
+            <a:avLst/>
+          </a:prstGeom>
+          <a:noFill/>
+          <a:ln>
+            <a:noFill/>
+          </a:ln>
+        </p:spPr>
+        <p:style>
+          <a:lnRef idx="2">
+            <a:schemeClr val="accent1">
+              <a:shade val="50000"/>
+            </a:schemeClr>
+          </a:lnRef>
+          <a:fillRef idx="1">
+            <a:schemeClr val="accent1"/>
+          </a:fillRef>
+          <a:effectRef idx="0">
+            <a:schemeClr val="accent1"/>
+          </a:effectRef>
+          <a:fontRef idx="minor">
+            <a:schemeClr val="lt1"/>
+          </a:fontRef>
+        </p:style>
+        <p:txBody>
+          <a:bodyPr rtlCol="0" anchor="ctr"/>
+          <a:lstStyle/>
+          <a:p>
+            <a:pPr algn="ctr"/>
+            <a:r>
+              <a:rPr lang="en-US" dirty="0" smtClean="0">
+                <a:solidFill>
+                  <a:schemeClr val="tx1"/>
+                </a:solidFill>
+              </a:rPr>
+              <a:t>Semantic information basic element</a:t>
+            </a:r>
+            <a:endParaRPr lang="cs-CZ" dirty="0">
+              <a:solidFill>
+                <a:schemeClr val="tx1"/>
+              </a:solidFill>
+            </a:endParaRPr>
+          </a:p>
+        </p:txBody>
+      </p:sp>
+      <p:sp>
+        <p:nvSpPr>
+          <p:cNvPr id="15" name="TextovéPole 14"/>
+          <p:cNvSpPr txBox="1"/>
+          <p:nvPr/>
+        </p:nvSpPr>
+        <p:spPr>
+          <a:xfrm>
+            <a:off x="928662" y="3429000"/>
+            <a:ext cx="6929486" cy="2308324"/>
+          </a:xfrm>
+          <a:prstGeom prst="rect">
+            <a:avLst/>
+          </a:prstGeom>
+          <a:noFill/>
+        </p:spPr>
+        <p:txBody>
+          <a:bodyPr wrap="square" rtlCol="0">
+            <a:spAutoFit/>
+          </a:bodyPr>
+          <a:lstStyle/>
+          <a:p>
+            <a:r>
+              <a:rPr lang="en-US" dirty="0" smtClean="0">
+                <a:solidFill>
+                  <a:schemeClr val="accent3">
+                    <a:lumMod val="75000"/>
+                  </a:schemeClr>
+                </a:solidFill>
+              </a:rPr>
+              <a:t>// generated object model</a:t>
+            </a:r>
+          </a:p>
+          <a:p>
+            <a:r>
+              <a:rPr lang="en-US" dirty="0" smtClean="0">
+                <a:solidFill>
+                  <a:schemeClr val="tx2">
+                    <a:lumMod val="60000"/>
+                    <a:lumOff val="40000"/>
+                  </a:schemeClr>
+                </a:solidFill>
+              </a:rPr>
+              <a:t>class</a:t>
+            </a:r>
+            <a:r>
+              <a:rPr lang="en-US" dirty="0" smtClean="0"/>
+              <a:t> </a:t>
+            </a:r>
+            <a:r>
+              <a:rPr lang="en-US" b="1" dirty="0" smtClean="0"/>
+              <a:t>subject</a:t>
+            </a:r>
+            <a:endParaRPr lang="en-US" dirty="0" smtClean="0"/>
+          </a:p>
+          <a:p>
+            <a:r>
+              <a:rPr lang="en-US" dirty="0" smtClean="0"/>
+              <a:t>{</a:t>
+            </a:r>
+          </a:p>
+          <a:p>
+            <a:r>
+              <a:rPr lang="en-US" dirty="0"/>
+              <a:t>	</a:t>
+            </a:r>
+            <a:r>
+              <a:rPr lang="en-US" dirty="0" smtClean="0">
+                <a:solidFill>
+                  <a:schemeClr val="accent1"/>
+                </a:solidFill>
+              </a:rPr>
+              <a:t>property</a:t>
+            </a:r>
+            <a:r>
+              <a:rPr lang="en-US" dirty="0" smtClean="0"/>
+              <a:t> list&lt;</a:t>
+            </a:r>
+            <a:r>
+              <a:rPr lang="en-US" b="1" dirty="0" smtClean="0"/>
+              <a:t>object</a:t>
+            </a:r>
+            <a:r>
+              <a:rPr lang="en-US" dirty="0" smtClean="0"/>
+              <a:t>&gt;</a:t>
+            </a:r>
+            <a:r>
+              <a:rPr lang="en-US" b="1" dirty="0" smtClean="0"/>
+              <a:t> </a:t>
+            </a:r>
+            <a:r>
+              <a:rPr lang="en-US" dirty="0" smtClean="0"/>
+              <a:t>predicate</a:t>
+            </a:r>
+          </a:p>
+          <a:p>
+            <a:r>
+              <a:rPr lang="en-US" dirty="0"/>
+              <a:t>	</a:t>
+            </a:r>
+            <a:r>
+              <a:rPr lang="en-US" dirty="0" smtClean="0"/>
+              <a:t>{</a:t>
+            </a:r>
+          </a:p>
+          <a:p>
+            <a:r>
+              <a:rPr lang="en-US" dirty="0"/>
+              <a:t>	</a:t>
+            </a:r>
+            <a:r>
+              <a:rPr lang="en-US" dirty="0" smtClean="0"/>
+              <a:t>	</a:t>
+            </a:r>
+            <a:r>
+              <a:rPr lang="en-US" dirty="0" smtClean="0">
+                <a:solidFill>
+                  <a:schemeClr val="tx2">
+                    <a:lumMod val="60000"/>
+                    <a:lumOff val="40000"/>
+                  </a:schemeClr>
+                </a:solidFill>
+              </a:rPr>
+              <a:t>get</a:t>
+            </a:r>
+            <a:r>
+              <a:rPr lang="en-US" dirty="0" smtClean="0"/>
+              <a:t>; </a:t>
+            </a:r>
+            <a:r>
+              <a:rPr lang="en-US" dirty="0" smtClean="0">
+                <a:solidFill>
+                  <a:schemeClr val="accent3">
+                    <a:lumMod val="75000"/>
+                  </a:schemeClr>
+                </a:solidFill>
+              </a:rPr>
+              <a:t>// called when a query is executed, extraction</a:t>
+            </a:r>
+          </a:p>
+          <a:p>
+            <a:r>
+              <a:rPr lang="en-US" dirty="0" smtClean="0"/>
+              <a:t> </a:t>
+            </a:r>
+            <a:r>
+              <a:rPr lang="en-US" dirty="0"/>
+              <a:t>	</a:t>
+            </a:r>
+            <a:r>
+              <a:rPr lang="en-US" dirty="0" smtClean="0"/>
+              <a:t>}</a:t>
+            </a:r>
+            <a:endParaRPr lang="en-US" dirty="0"/>
+          </a:p>
+          <a:p>
+            <a:r>
+              <a:rPr lang="en-US" dirty="0" smtClean="0"/>
+              <a:t>}</a:t>
+            </a:r>
+          </a:p>
+        </p:txBody>
+      </p:sp>
+      <p:sp>
+        <p:nvSpPr>
+          <p:cNvPr id="29" name="Vývojový diagram: postup 28"/>
+          <p:cNvSpPr/>
+          <p:nvPr/>
+        </p:nvSpPr>
+        <p:spPr>
+          <a:xfrm>
+            <a:off x="928662" y="5929330"/>
+            <a:ext cx="6929486" cy="500066"/>
+          </a:xfrm>
+          <a:prstGeom prst="flowChartProcess">
+            <a:avLst/>
+          </a:prstGeom>
+          <a:noFill/>
+          <a:ln>
+            <a:noFill/>
+          </a:ln>
+        </p:spPr>
+        <p:style>
+          <a:lnRef idx="2">
+            <a:schemeClr val="accent1">
+              <a:shade val="50000"/>
+            </a:schemeClr>
+          </a:lnRef>
+          <a:fillRef idx="1">
+            <a:schemeClr val="accent1"/>
+          </a:fillRef>
+          <a:effectRef idx="0">
+            <a:schemeClr val="accent1"/>
+          </a:effectRef>
+          <a:fontRef idx="minor">
+            <a:schemeClr val="lt1"/>
+          </a:fontRef>
+        </p:style>
+        <p:txBody>
+          <a:bodyPr rtlCol="0" anchor="ctr"/>
+          <a:lstStyle/>
+          <a:p>
+            <a:pPr algn="ctr"/>
+            <a:r>
+              <a:rPr lang="en-US" dirty="0" smtClean="0">
+                <a:solidFill>
+                  <a:schemeClr val="tx1"/>
+                </a:solidFill>
+              </a:rPr>
+              <a:t>Object model implementation</a:t>
+            </a:r>
+            <a:endParaRPr lang="cs-CZ" dirty="0">
+              <a:solidFill>
+                <a:schemeClr val="tx1"/>
+              </a:solidFill>
+            </a:endParaRPr>
           </a:p>
         </p:txBody>
       </p:sp>

</xml_diff>

<commit_message>
- just some diagrams
git-svn-id: https://linqtoweb.svn.codeplex.com/svn@45299 142e9c35-602f-4880-9f37-ec48a24daa6a
</commit_message>
<xml_diff>
--- a/Documentation/diagrams.pptx
+++ b/Documentation/diagrams.pptx
@@ -5,12 +5,13 @@
     <p:sldMasterId id="2147483648" r:id="rId1"/>
   </p:sldMasterIdLst>
   <p:notesMasterIdLst>
-    <p:notesMasterId r:id="rId5"/>
+    <p:notesMasterId r:id="rId6"/>
   </p:notesMasterIdLst>
   <p:sldIdLst>
     <p:sldId id="256" r:id="rId2"/>
     <p:sldId id="257" r:id="rId3"/>
     <p:sldId id="258" r:id="rId4"/>
+    <p:sldId id="259" r:id="rId5"/>
   </p:sldIdLst>
   <p:sldSz cx="9144000" cy="6858000" type="screen4x3"/>
   <p:notesSz cx="6858000" cy="9144000"/>
@@ -194,7 +195,8 @@
           <a:p>
             <a:fld id="{085AF54C-BFA0-4AFD-A2B9-1B1F631CFD23}" type="datetimeFigureOut">
               <a:rPr lang="cs-CZ" smtClean="0"/>
-              <a:t>13.12.2009</a:t>
+              <a:pPr/>
+              <a:t>12.1.2010</a:t>
             </a:fld>
             <a:endParaRPr lang="cs-CZ"/>
           </a:p>
@@ -355,6 +357,7 @@
           <a:p>
             <a:fld id="{8C1FD11E-7A31-422B-98F9-455B58D9FBE8}" type="slidenum">
               <a:rPr lang="cs-CZ" smtClean="0"/>
+              <a:pPr/>
               <a:t>‹#›</a:t>
             </a:fld>
             <a:endParaRPr lang="cs-CZ"/>
@@ -530,6 +533,7 @@
           <a:p>
             <a:fld id="{8C1FD11E-7A31-422B-98F9-455B58D9FBE8}" type="slidenum">
               <a:rPr lang="cs-CZ" smtClean="0"/>
+              <a:pPr/>
               <a:t>1</a:t>
             </a:fld>
             <a:endParaRPr lang="cs-CZ"/>
@@ -604,7 +608,23 @@
             </a:r>
             <a:r>
               <a:rPr lang="en-US" baseline="0" dirty="0" smtClean="0"/>
-              <a:t> (when query is executed), database only as a big cache, extraction framework controls queries, easier to use!</a:t>
+              <a:t> (when query is executed), database only as a big cache, extraction framework controls queries, easier to use</a:t>
+            </a:r>
+            <a:r>
+              <a:rPr lang="en-US" baseline="0" dirty="0" smtClean="0"/>
+              <a:t>!</a:t>
+            </a:r>
+            <a:r>
+              <a:rPr lang="cs-CZ" baseline="0" dirty="0" smtClean="0"/>
+              <a:t> </a:t>
+            </a:r>
+            <a:r>
+              <a:rPr lang="en-US" baseline="0" dirty="0" smtClean="0"/>
+              <a:t>(better </a:t>
+            </a:r>
+            <a:r>
+              <a:rPr lang="en-US" baseline="0" smtClean="0"/>
+              <a:t>to work with)</a:t>
             </a:r>
             <a:endParaRPr lang="cs-CZ" dirty="0"/>
           </a:p>
@@ -627,6 +647,7 @@
           <a:p>
             <a:fld id="{8C1FD11E-7A31-422B-98F9-455B58D9FBE8}" type="slidenum">
               <a:rPr lang="cs-CZ" smtClean="0"/>
+              <a:pPr/>
               <a:t>2</a:t>
             </a:fld>
             <a:endParaRPr lang="cs-CZ"/>
@@ -822,7 +843,8 @@
           <a:p>
             <a:fld id="{EE61FD48-02F4-46B3-996C-76A85B898370}" type="datetimeFigureOut">
               <a:rPr lang="cs-CZ" smtClean="0"/>
-              <a:t>13.12.2009</a:t>
+              <a:pPr/>
+              <a:t>12.1.2010</a:t>
             </a:fld>
             <a:endParaRPr lang="cs-CZ"/>
           </a:p>
@@ -864,6 +886,7 @@
           <a:p>
             <a:fld id="{10435A46-FB82-46EB-8323-39AF3B71E119}" type="slidenum">
               <a:rPr lang="cs-CZ" smtClean="0"/>
+              <a:pPr/>
               <a:t>‹#›</a:t>
             </a:fld>
             <a:endParaRPr lang="cs-CZ"/>
@@ -987,7 +1010,8 @@
           <a:p>
             <a:fld id="{EE61FD48-02F4-46B3-996C-76A85B898370}" type="datetimeFigureOut">
               <a:rPr lang="cs-CZ" smtClean="0"/>
-              <a:t>13.12.2009</a:t>
+              <a:pPr/>
+              <a:t>12.1.2010</a:t>
             </a:fld>
             <a:endParaRPr lang="cs-CZ"/>
           </a:p>
@@ -1029,6 +1053,7 @@
           <a:p>
             <a:fld id="{10435A46-FB82-46EB-8323-39AF3B71E119}" type="slidenum">
               <a:rPr lang="cs-CZ" smtClean="0"/>
+              <a:pPr/>
               <a:t>‹#›</a:t>
             </a:fld>
             <a:endParaRPr lang="cs-CZ"/>
@@ -1162,7 +1187,8 @@
           <a:p>
             <a:fld id="{EE61FD48-02F4-46B3-996C-76A85B898370}" type="datetimeFigureOut">
               <a:rPr lang="cs-CZ" smtClean="0"/>
-              <a:t>13.12.2009</a:t>
+              <a:pPr/>
+              <a:t>12.1.2010</a:t>
             </a:fld>
             <a:endParaRPr lang="cs-CZ"/>
           </a:p>
@@ -1204,6 +1230,7 @@
           <a:p>
             <a:fld id="{10435A46-FB82-46EB-8323-39AF3B71E119}" type="slidenum">
               <a:rPr lang="cs-CZ" smtClean="0"/>
+              <a:pPr/>
               <a:t>‹#›</a:t>
             </a:fld>
             <a:endParaRPr lang="cs-CZ"/>
@@ -1327,7 +1354,8 @@
           <a:p>
             <a:fld id="{EE61FD48-02F4-46B3-996C-76A85B898370}" type="datetimeFigureOut">
               <a:rPr lang="cs-CZ" smtClean="0"/>
-              <a:t>13.12.2009</a:t>
+              <a:pPr/>
+              <a:t>12.1.2010</a:t>
             </a:fld>
             <a:endParaRPr lang="cs-CZ"/>
           </a:p>
@@ -1369,6 +1397,7 @@
           <a:p>
             <a:fld id="{10435A46-FB82-46EB-8323-39AF3B71E119}" type="slidenum">
               <a:rPr lang="cs-CZ" smtClean="0"/>
+              <a:pPr/>
               <a:t>‹#›</a:t>
             </a:fld>
             <a:endParaRPr lang="cs-CZ"/>
@@ -1568,7 +1597,8 @@
           <a:p>
             <a:fld id="{EE61FD48-02F4-46B3-996C-76A85B898370}" type="datetimeFigureOut">
               <a:rPr lang="cs-CZ" smtClean="0"/>
-              <a:t>13.12.2009</a:t>
+              <a:pPr/>
+              <a:t>12.1.2010</a:t>
             </a:fld>
             <a:endParaRPr lang="cs-CZ"/>
           </a:p>
@@ -1610,6 +1640,7 @@
           <a:p>
             <a:fld id="{10435A46-FB82-46EB-8323-39AF3B71E119}" type="slidenum">
               <a:rPr lang="cs-CZ" smtClean="0"/>
+              <a:pPr/>
               <a:t>‹#›</a:t>
             </a:fld>
             <a:endParaRPr lang="cs-CZ"/>
@@ -1851,7 +1882,8 @@
           <a:p>
             <a:fld id="{EE61FD48-02F4-46B3-996C-76A85B898370}" type="datetimeFigureOut">
               <a:rPr lang="cs-CZ" smtClean="0"/>
-              <a:t>13.12.2009</a:t>
+              <a:pPr/>
+              <a:t>12.1.2010</a:t>
             </a:fld>
             <a:endParaRPr lang="cs-CZ"/>
           </a:p>
@@ -1893,6 +1925,7 @@
           <a:p>
             <a:fld id="{10435A46-FB82-46EB-8323-39AF3B71E119}" type="slidenum">
               <a:rPr lang="cs-CZ" smtClean="0"/>
+              <a:pPr/>
               <a:t>‹#›</a:t>
             </a:fld>
             <a:endParaRPr lang="cs-CZ"/>
@@ -2268,7 +2301,8 @@
           <a:p>
             <a:fld id="{EE61FD48-02F4-46B3-996C-76A85B898370}" type="datetimeFigureOut">
               <a:rPr lang="cs-CZ" smtClean="0"/>
-              <a:t>13.12.2009</a:t>
+              <a:pPr/>
+              <a:t>12.1.2010</a:t>
             </a:fld>
             <a:endParaRPr lang="cs-CZ"/>
           </a:p>
@@ -2310,6 +2344,7 @@
           <a:p>
             <a:fld id="{10435A46-FB82-46EB-8323-39AF3B71E119}" type="slidenum">
               <a:rPr lang="cs-CZ" smtClean="0"/>
+              <a:pPr/>
               <a:t>‹#›</a:t>
             </a:fld>
             <a:endParaRPr lang="cs-CZ"/>
@@ -2381,7 +2416,8 @@
           <a:p>
             <a:fld id="{EE61FD48-02F4-46B3-996C-76A85B898370}" type="datetimeFigureOut">
               <a:rPr lang="cs-CZ" smtClean="0"/>
-              <a:t>13.12.2009</a:t>
+              <a:pPr/>
+              <a:t>12.1.2010</a:t>
             </a:fld>
             <a:endParaRPr lang="cs-CZ"/>
           </a:p>
@@ -2423,6 +2459,7 @@
           <a:p>
             <a:fld id="{10435A46-FB82-46EB-8323-39AF3B71E119}" type="slidenum">
               <a:rPr lang="cs-CZ" smtClean="0"/>
+              <a:pPr/>
               <a:t>‹#›</a:t>
             </a:fld>
             <a:endParaRPr lang="cs-CZ"/>
@@ -2471,7 +2508,8 @@
           <a:p>
             <a:fld id="{EE61FD48-02F4-46B3-996C-76A85B898370}" type="datetimeFigureOut">
               <a:rPr lang="cs-CZ" smtClean="0"/>
-              <a:t>13.12.2009</a:t>
+              <a:pPr/>
+              <a:t>12.1.2010</a:t>
             </a:fld>
             <a:endParaRPr lang="cs-CZ"/>
           </a:p>
@@ -2513,6 +2551,7 @@
           <a:p>
             <a:fld id="{10435A46-FB82-46EB-8323-39AF3B71E119}" type="slidenum">
               <a:rPr lang="cs-CZ" smtClean="0"/>
+              <a:pPr/>
               <a:t>‹#›</a:t>
             </a:fld>
             <a:endParaRPr lang="cs-CZ"/>
@@ -2743,7 +2782,8 @@
           <a:p>
             <a:fld id="{EE61FD48-02F4-46B3-996C-76A85B898370}" type="datetimeFigureOut">
               <a:rPr lang="cs-CZ" smtClean="0"/>
-              <a:t>13.12.2009</a:t>
+              <a:pPr/>
+              <a:t>12.1.2010</a:t>
             </a:fld>
             <a:endParaRPr lang="cs-CZ"/>
           </a:p>
@@ -2785,6 +2825,7 @@
           <a:p>
             <a:fld id="{10435A46-FB82-46EB-8323-39AF3B71E119}" type="slidenum">
               <a:rPr lang="cs-CZ" smtClean="0"/>
+              <a:pPr/>
               <a:t>‹#›</a:t>
             </a:fld>
             <a:endParaRPr lang="cs-CZ"/>
@@ -2991,7 +3032,8 @@
           <a:p>
             <a:fld id="{EE61FD48-02F4-46B3-996C-76A85B898370}" type="datetimeFigureOut">
               <a:rPr lang="cs-CZ" smtClean="0"/>
-              <a:t>13.12.2009</a:t>
+              <a:pPr/>
+              <a:t>12.1.2010</a:t>
             </a:fld>
             <a:endParaRPr lang="cs-CZ"/>
           </a:p>
@@ -3033,6 +3075,7 @@
           <a:p>
             <a:fld id="{10435A46-FB82-46EB-8323-39AF3B71E119}" type="slidenum">
               <a:rPr lang="cs-CZ" smtClean="0"/>
+              <a:pPr/>
               <a:t>‹#›</a:t>
             </a:fld>
             <a:endParaRPr lang="cs-CZ"/>
@@ -3199,7 +3242,8 @@
           <a:p>
             <a:fld id="{EE61FD48-02F4-46B3-996C-76A85B898370}" type="datetimeFigureOut">
               <a:rPr lang="cs-CZ" smtClean="0"/>
-              <a:t>13.12.2009</a:t>
+              <a:pPr/>
+              <a:t>12.1.2010</a:t>
             </a:fld>
             <a:endParaRPr lang="cs-CZ"/>
           </a:p>
@@ -3277,6 +3321,7 @@
           <a:p>
             <a:fld id="{10435A46-FB82-46EB-8323-39AF3B71E119}" type="slidenum">
               <a:rPr lang="cs-CZ" smtClean="0"/>
+              <a:pPr/>
               <a:t>‹#›</a:t>
             </a:fld>
             <a:endParaRPr lang="cs-CZ"/>
@@ -5348,8 +5393,8 @@
         </p:nvSpPr>
         <p:spPr>
           <a:xfrm>
-            <a:off x="0" y="3214686"/>
-            <a:ext cx="9144000" cy="3286148"/>
+            <a:off x="0" y="3000372"/>
+            <a:ext cx="9144000" cy="3500462"/>
           </a:xfrm>
           <a:prstGeom prst="flowChartProcess">
             <a:avLst/>
@@ -5461,11 +5506,7 @@
           <a:p>
             <a:r>
               <a:rPr lang="en-US" sz="1800" dirty="0" smtClean="0"/>
-              <a:t>LINQ to Web, generating abstraction (</a:t>
-            </a:r>
-            <a:r>
-              <a:rPr lang="en-US" sz="1800" dirty="0" smtClean="0"/>
-              <a:t>object model)</a:t>
+              <a:t>LINQ to Web, generating abstraction (object model)</a:t>
             </a:r>
             <a:endParaRPr lang="en-US" sz="1800" dirty="0"/>
           </a:p>
@@ -5777,8 +5818,8 @@
         </p:nvSpPr>
         <p:spPr>
           <a:xfrm>
-            <a:off x="928662" y="3429000"/>
-            <a:ext cx="6929486" cy="2308324"/>
+            <a:off x="928662" y="3143248"/>
+            <a:ext cx="6929486" cy="2585323"/>
           </a:xfrm>
           <a:prstGeom prst="rect">
             <a:avLst/>
@@ -5790,18 +5831,6 @@
             <a:spAutoFit/>
           </a:bodyPr>
           <a:lstStyle/>
-          <a:p>
-            <a:r>
-              <a:rPr lang="en-US" dirty="0" smtClean="0">
-                <a:solidFill>
-                  <a:schemeClr val="accent3">
-                    <a:lumMod val="75000"/>
-                  </a:schemeClr>
-                </a:solidFill>
-              </a:rPr>
-              <a:t>// generated object model</a:t>
-            </a:r>
-          </a:p>
           <a:p>
             <a:r>
               <a:rPr lang="en-US" dirty="0" smtClean="0">
@@ -5857,11 +5886,17 @@
             </a:r>
             <a:r>
               <a:rPr lang="en-US" b="1" dirty="0" smtClean="0"/>
-              <a:t> </a:t>
-            </a:r>
-            <a:r>
-              <a:rPr lang="en-US" dirty="0" smtClean="0"/>
-              <a:t>predicate</a:t>
+              <a:t> predicate</a:t>
+            </a:r>
+            <a:r>
+              <a:rPr lang="en-US" dirty="0" smtClean="0">
+                <a:solidFill>
+                  <a:schemeClr val="accent3">
+                    <a:lumMod val="75000"/>
+                  </a:schemeClr>
+                </a:solidFill>
+              </a:rPr>
+              <a:t>//in case of collection</a:t>
             </a:r>
           </a:p>
           <a:p>
@@ -5922,7 +5957,52 @@
               <a:rPr lang="en-US" dirty="0" smtClean="0"/>
               <a:t>}</a:t>
             </a:r>
-            <a:endParaRPr lang="en-US" dirty="0"/>
+          </a:p>
+          <a:p>
+            <a:endParaRPr lang="en-US" dirty="0" smtClean="0"/>
+          </a:p>
+          <a:p>
+            <a:r>
+              <a:rPr lang="en-US" dirty="0" smtClean="0"/>
+              <a:t>	</a:t>
+            </a:r>
+            <a:r>
+              <a:rPr lang="en-US" dirty="0" smtClean="0">
+                <a:solidFill>
+                  <a:schemeClr val="accent1"/>
+                </a:solidFill>
+              </a:rPr>
+              <a:t>property</a:t>
+            </a:r>
+            <a:r>
+              <a:rPr lang="en-US" dirty="0" smtClean="0"/>
+              <a:t> </a:t>
+            </a:r>
+            <a:r>
+              <a:rPr lang="en-US" b="1" dirty="0" smtClean="0"/>
+              <a:t>object predicate</a:t>
+            </a:r>
+            <a:r>
+              <a:rPr lang="en-US" dirty="0" smtClean="0"/>
+              <a:t>;</a:t>
+            </a:r>
+            <a:r>
+              <a:rPr lang="en-US" dirty="0" smtClean="0">
+                <a:solidFill>
+                  <a:schemeClr val="accent3">
+                    <a:lumMod val="75000"/>
+                  </a:schemeClr>
+                </a:solidFill>
+              </a:rPr>
+              <a:t>//in case of the only value</a:t>
+            </a:r>
+            <a:endParaRPr lang="en-US" dirty="0">
+              <a:solidFill>
+                <a:schemeClr val="accent3">
+                  <a:lumMod val="75000"/>
+                </a:schemeClr>
+              </a:solidFill>
+            </a:endParaRPr>
           </a:p>
           <a:p>
             <a:r>
@@ -5978,13 +6058,68 @@
                   <a:schemeClr val="tx1"/>
                 </a:solidFill>
               </a:rPr>
-              <a:t>Object model implementation</a:t>
+              <a:t>Generated object model implementation</a:t>
             </a:r>
             <a:endParaRPr lang="cs-CZ" dirty="0">
               <a:solidFill>
                 <a:schemeClr val="tx1"/>
               </a:solidFill>
             </a:endParaRPr>
+          </a:p>
+        </p:txBody>
+      </p:sp>
+    </p:spTree>
+  </p:cSld>
+  <p:clrMapOvr>
+    <a:masterClrMapping/>
+  </p:clrMapOvr>
+</p:sld>
+</file>
+
+<file path=ppt/slides/slide4.xml><?xml version="1.0" encoding="utf-8"?>
+<p:sld xmlns:a="http://schemas.openxmlformats.org/drawingml/2006/main" xmlns:r="http://schemas.openxmlformats.org/officeDocument/2006/relationships" xmlns:p="http://schemas.openxmlformats.org/presentationml/2006/main">
+  <p:cSld>
+    <p:spTree>
+      <p:nvGrpSpPr>
+        <p:cNvPr id="1" name=""/>
+        <p:cNvGrpSpPr/>
+        <p:nvPr/>
+      </p:nvGrpSpPr>
+      <p:grpSpPr>
+        <a:xfrm>
+          <a:off x="0" y="0"/>
+          <a:ext cx="0" cy="0"/>
+          <a:chOff x="0" y="0"/>
+          <a:chExt cx="0" cy="0"/>
+        </a:xfrm>
+      </p:grpSpPr>
+      <p:sp>
+        <p:nvSpPr>
+          <p:cNvPr id="3" name="Nadpis 3"/>
+          <p:cNvSpPr>
+            <a:spLocks noGrp="1"/>
+          </p:cNvSpPr>
+          <p:nvPr>
+            <p:ph type="title"/>
+          </p:nvPr>
+        </p:nvSpPr>
+        <p:spPr>
+          <a:xfrm>
+            <a:off x="457200" y="274638"/>
+            <a:ext cx="8229600" cy="368280"/>
+          </a:xfrm>
+        </p:spPr>
+        <p:txBody>
+          <a:bodyPr>
+            <a:noAutofit/>
+          </a:bodyPr>
+          <a:lstStyle/>
+          <a:p>
+            <a:r>
+              <a:rPr lang="en-US" sz="1800" dirty="0" smtClean="0"/>
+              <a:t>LINQ to Web, provider</a:t>
+            </a:r>
+            <a:endParaRPr lang="en-US" sz="1800" dirty="0"/>
           </a:p>
         </p:txBody>
       </p:sp>

</xml_diff>